<commit_message>
Changed color theme for ppt
</commit_message>
<xml_diff>
--- a/Weekly update.pptx
+++ b/Weekly update.pptx
@@ -2,7 +2,7 @@
 <file path=ppt/presentation.xml><?xml version="1.0" encoding="utf-8"?>
 <p:presentation xmlns:a="http://schemas.openxmlformats.org/drawingml/2006/main" xmlns:r="http://schemas.openxmlformats.org/officeDocument/2006/relationships" xmlns:p="http://schemas.openxmlformats.org/presentationml/2006/main" saveSubsetFonts="1">
   <p:sldMasterIdLst>
-    <p:sldMasterId id="2147483696" r:id="rId1"/>
+    <p:sldMasterId id="2147483708" r:id="rId1"/>
   </p:sldMasterIdLst>
   <p:sldIdLst>
     <p:sldId id="256" r:id="rId2"/>
@@ -110,6 +110,11 @@
       </a:defRPr>
     </a:lvl9pPr>
   </p:defaultTextStyle>
+  <p:extLst>
+    <p:ext uri="{EFAFB233-063F-42B5-8137-9DF3F51BA10A}">
+      <p15:sldGuideLst xmlns:p15="http://schemas.microsoft.com/office/powerpoint/2012/main"/>
+    </p:ext>
+  </p:extLst>
 </p:presentation>
 </file>
 
@@ -295,7 +300,7 @@
     </p:spTree>
     <p:extLst>
       <p:ext uri="{BB962C8B-B14F-4D97-AF65-F5344CB8AC3E}">
-        <p14:creationId xmlns:p14="http://schemas.microsoft.com/office/powerpoint/2010/main" val="3873761586"/>
+        <p14:creationId xmlns:p14="http://schemas.microsoft.com/office/powerpoint/2010/main" val="1322158732"/>
       </p:ext>
     </p:extLst>
   </p:cSld>
@@ -465,7 +470,7 @@
     </p:spTree>
     <p:extLst>
       <p:ext uri="{BB962C8B-B14F-4D97-AF65-F5344CB8AC3E}">
-        <p14:creationId xmlns:p14="http://schemas.microsoft.com/office/powerpoint/2010/main" val="1149587221"/>
+        <p14:creationId xmlns:p14="http://schemas.microsoft.com/office/powerpoint/2010/main" val="679621999"/>
       </p:ext>
     </p:extLst>
   </p:cSld>
@@ -645,7 +650,7 @@
     </p:spTree>
     <p:extLst>
       <p:ext uri="{BB962C8B-B14F-4D97-AF65-F5344CB8AC3E}">
-        <p14:creationId xmlns:p14="http://schemas.microsoft.com/office/powerpoint/2010/main" val="3013606361"/>
+        <p14:creationId xmlns:p14="http://schemas.microsoft.com/office/powerpoint/2010/main" val="1840545504"/>
       </p:ext>
     </p:extLst>
   </p:cSld>
@@ -815,7 +820,7 @@
     </p:spTree>
     <p:extLst>
       <p:ext uri="{BB962C8B-B14F-4D97-AF65-F5344CB8AC3E}">
-        <p14:creationId xmlns:p14="http://schemas.microsoft.com/office/powerpoint/2010/main" val="3671482092"/>
+        <p14:creationId xmlns:p14="http://schemas.microsoft.com/office/powerpoint/2010/main" val="2210077078"/>
       </p:ext>
     </p:extLst>
   </p:cSld>
@@ -1061,7 +1066,7 @@
     </p:spTree>
     <p:extLst>
       <p:ext uri="{BB962C8B-B14F-4D97-AF65-F5344CB8AC3E}">
-        <p14:creationId xmlns:p14="http://schemas.microsoft.com/office/powerpoint/2010/main" val="450030649"/>
+        <p14:creationId xmlns:p14="http://schemas.microsoft.com/office/powerpoint/2010/main" val="461638298"/>
       </p:ext>
     </p:extLst>
   </p:cSld>
@@ -1293,7 +1298,7 @@
     </p:spTree>
     <p:extLst>
       <p:ext uri="{BB962C8B-B14F-4D97-AF65-F5344CB8AC3E}">
-        <p14:creationId xmlns:p14="http://schemas.microsoft.com/office/powerpoint/2010/main" val="3935528927"/>
+        <p14:creationId xmlns:p14="http://schemas.microsoft.com/office/powerpoint/2010/main" val="2711871209"/>
       </p:ext>
     </p:extLst>
   </p:cSld>
@@ -1660,7 +1665,7 @@
     </p:spTree>
     <p:extLst>
       <p:ext uri="{BB962C8B-B14F-4D97-AF65-F5344CB8AC3E}">
-        <p14:creationId xmlns:p14="http://schemas.microsoft.com/office/powerpoint/2010/main" val="2735639884"/>
+        <p14:creationId xmlns:p14="http://schemas.microsoft.com/office/powerpoint/2010/main" val="1420190127"/>
       </p:ext>
     </p:extLst>
   </p:cSld>
@@ -1778,7 +1783,7 @@
     </p:spTree>
     <p:extLst>
       <p:ext uri="{BB962C8B-B14F-4D97-AF65-F5344CB8AC3E}">
-        <p14:creationId xmlns:p14="http://schemas.microsoft.com/office/powerpoint/2010/main" val="1724659218"/>
+        <p14:creationId xmlns:p14="http://schemas.microsoft.com/office/powerpoint/2010/main" val="3998894358"/>
       </p:ext>
     </p:extLst>
   </p:cSld>
@@ -1873,7 +1878,7 @@
     </p:spTree>
     <p:extLst>
       <p:ext uri="{BB962C8B-B14F-4D97-AF65-F5344CB8AC3E}">
-        <p14:creationId xmlns:p14="http://schemas.microsoft.com/office/powerpoint/2010/main" val="1000662296"/>
+        <p14:creationId xmlns:p14="http://schemas.microsoft.com/office/powerpoint/2010/main" val="4251073468"/>
       </p:ext>
     </p:extLst>
   </p:cSld>
@@ -2150,7 +2155,7 @@
     </p:spTree>
     <p:extLst>
       <p:ext uri="{BB962C8B-B14F-4D97-AF65-F5344CB8AC3E}">
-        <p14:creationId xmlns:p14="http://schemas.microsoft.com/office/powerpoint/2010/main" val="1326109170"/>
+        <p14:creationId xmlns:p14="http://schemas.microsoft.com/office/powerpoint/2010/main" val="1481190456"/>
       </p:ext>
     </p:extLst>
   </p:cSld>
@@ -2407,7 +2412,7 @@
     </p:spTree>
     <p:extLst>
       <p:ext uri="{BB962C8B-B14F-4D97-AF65-F5344CB8AC3E}">
-        <p14:creationId xmlns:p14="http://schemas.microsoft.com/office/powerpoint/2010/main" val="3492344451"/>
+        <p14:creationId xmlns:p14="http://schemas.microsoft.com/office/powerpoint/2010/main" val="510381750"/>
       </p:ext>
     </p:extLst>
   </p:cSld>
@@ -2656,23 +2661,23 @@
     </p:spTree>
     <p:extLst>
       <p:ext uri="{BB962C8B-B14F-4D97-AF65-F5344CB8AC3E}">
-        <p14:creationId xmlns:p14="http://schemas.microsoft.com/office/powerpoint/2010/main" val="2159009598"/>
+        <p14:creationId xmlns:p14="http://schemas.microsoft.com/office/powerpoint/2010/main" val="3497068793"/>
       </p:ext>
     </p:extLst>
   </p:cSld>
-  <p:clrMap bg1="dk1" tx1="lt1" bg2="dk2" tx2="lt2" accent1="accent1" accent2="accent2" accent3="accent3" accent4="accent4" accent5="accent5" accent6="accent6" hlink="hlink" folHlink="folHlink"/>
+  <p:clrMap bg1="lt1" tx1="dk1" bg2="lt2" tx2="dk2" accent1="accent1" accent2="accent2" accent3="accent3" accent4="accent4" accent5="accent5" accent6="accent6" hlink="hlink" folHlink="folHlink"/>
   <p:sldLayoutIdLst>
-    <p:sldLayoutId id="2147483697" r:id="rId1"/>
-    <p:sldLayoutId id="2147483698" r:id="rId2"/>
-    <p:sldLayoutId id="2147483699" r:id="rId3"/>
-    <p:sldLayoutId id="2147483700" r:id="rId4"/>
-    <p:sldLayoutId id="2147483701" r:id="rId5"/>
-    <p:sldLayoutId id="2147483702" r:id="rId6"/>
-    <p:sldLayoutId id="2147483703" r:id="rId7"/>
-    <p:sldLayoutId id="2147483704" r:id="rId8"/>
-    <p:sldLayoutId id="2147483705" r:id="rId9"/>
-    <p:sldLayoutId id="2147483706" r:id="rId10"/>
-    <p:sldLayoutId id="2147483707" r:id="rId11"/>
+    <p:sldLayoutId id="2147483709" r:id="rId1"/>
+    <p:sldLayoutId id="2147483710" r:id="rId2"/>
+    <p:sldLayoutId id="2147483711" r:id="rId3"/>
+    <p:sldLayoutId id="2147483712" r:id="rId4"/>
+    <p:sldLayoutId id="2147483713" r:id="rId5"/>
+    <p:sldLayoutId id="2147483714" r:id="rId6"/>
+    <p:sldLayoutId id="2147483715" r:id="rId7"/>
+    <p:sldLayoutId id="2147483716" r:id="rId8"/>
+    <p:sldLayoutId id="2147483717" r:id="rId9"/>
+    <p:sldLayoutId id="2147483718" r:id="rId10"/>
+    <p:sldLayoutId id="2147483719" r:id="rId11"/>
   </p:sldLayoutIdLst>
   <p:txStyles>
     <p:titleStyle>
@@ -3769,8 +3774,8 @@
           </a:p>
         </p:txBody>
       </p:sp>
-      <mc:AlternateContent xmlns:mc="http://schemas.openxmlformats.org/markup-compatibility/2006">
-        <mc:Choice xmlns:a14="http://schemas.microsoft.com/office/drawing/2010/main" Requires="a14">
+      <mc:AlternateContent xmlns:mc="http://schemas.openxmlformats.org/markup-compatibility/2006" xmlns:a14="http://schemas.microsoft.com/office/drawing/2010/main">
+        <mc:Choice Requires="a14">
           <p:sp>
             <p:nvSpPr>
               <p:cNvPr id="3" name="Content Placeholder 2">
@@ -4371,7 +4376,7 @@
             </p:txBody>
           </p:sp>
         </mc:Choice>
-        <mc:Fallback>
+        <mc:Fallback xmlns="">
           <p:sp>
             <p:nvSpPr>
               <p:cNvPr id="3" name="Content Placeholder 2">
@@ -4954,22 +4959,22 @@
         <a:srgbClr val="E7E6E6"/>
       </a:lt2>
       <a:accent1>
-        <a:srgbClr val="4472C4"/>
+        <a:srgbClr val="1D9A78"/>
       </a:accent1>
       <a:accent2>
-        <a:srgbClr val="ED7D31"/>
+        <a:srgbClr val="8BC145"/>
       </a:accent2>
       <a:accent3>
-        <a:srgbClr val="A5A5A5"/>
+        <a:srgbClr val="36AFCE"/>
       </a:accent3>
       <a:accent4>
-        <a:srgbClr val="FFC000"/>
+        <a:srgbClr val="1D6FA9"/>
       </a:accent4>
       <a:accent5>
-        <a:srgbClr val="5B9BD5"/>
+        <a:srgbClr val="B74919"/>
       </a:accent5>
       <a:accent6>
-        <a:srgbClr val="70AD47"/>
+        <a:srgbClr val="F19D19"/>
       </a:accent6>
       <a:hlink>
         <a:srgbClr val="0563C1"/>
@@ -5192,7 +5197,7 @@
   <a:extraClrSchemeLst/>
   <a:extLst>
     <a:ext uri="{05A4C25C-085E-4340-85A3-A5531E510DB2}">
-      <thm15:themeFamily xmlns:thm15="http://schemas.microsoft.com/office/thememl/2012/main" name="Office Theme 2013 - 2022" id="{62F939B6-93AF-4DB8-9C6B-D6C7DFDC589F}" vid="{4F46216B-77A9-411A-B9D3-5023FCB70208}"/>
+      <thm15:themeFamily xmlns:thm15="http://schemas.microsoft.com/office/thememl/2012/main" name="Office Theme 2013 - 2022" id="{62F939B6-93AF-4DB8-9C6B-D6C7DFDC589F}" vid="{AE6F2518-B084-4896-AF52-66CC2144AA26}"/>
     </a:ext>
   </a:extLst>
 </a:theme>

</xml_diff>